<commit_message>
Updated the packaging status
</commit_message>
<xml_diff>
--- a/Performance Evaluation of MLT in Web Page Load Time Prediction - Java Classes.pptx
+++ b/Performance Evaluation of MLT in Web Page Load Time Prediction - Java Classes.pptx
@@ -4699,24 +4699,7 @@
                 <a:latin typeface="Arial" panose="020B0604020202020204" pitchFamily="34" charset="0"/>
                 <a:cs typeface="Arial" panose="020B0604020202020204" pitchFamily="34" charset="0"/>
               </a:rPr>
-              <a:t>Work in progress: The </a:t>
-            </a:r>
-            <a:r>
-              <a:rPr lang="en-IN">
-                <a:latin typeface="Arial" panose="020B0604020202020204" pitchFamily="34" charset="0"/>
-                <a:cs typeface="Arial" panose="020B0604020202020204" pitchFamily="34" charset="0"/>
-              </a:rPr>
-              <a:t>package </a:t>
-            </a:r>
-            <a:r>
-              <a:rPr lang="en-IN">
-                <a:solidFill>
-                  <a:schemeClr val="accent1"/>
-                </a:solidFill>
-                <a:latin typeface="Arial" panose="020B0604020202020204" pitchFamily="34" charset="0"/>
-                <a:cs typeface="Arial" panose="020B0604020202020204" pitchFamily="34" charset="0"/>
-              </a:rPr>
-              <a:t>plt-java.</a:t>
+              <a:t>The package </a:t>
             </a:r>
             <a:r>
               <a:rPr lang="en-IN" dirty="0">
@@ -4726,15 +4709,26 @@
                 <a:latin typeface="Arial" panose="020B0604020202020204" pitchFamily="34" charset="0"/>
                 <a:cs typeface="Arial" panose="020B0604020202020204" pitchFamily="34" charset="0"/>
               </a:rPr>
-              <a:t>zip</a:t>
+              <a:t>plt-java.zip</a:t>
             </a:r>
             <a:r>
               <a:rPr lang="en-IN" dirty="0">
                 <a:latin typeface="Arial" panose="020B0604020202020204" pitchFamily="34" charset="0"/>
                 <a:cs typeface="Arial" panose="020B0604020202020204" pitchFamily="34" charset="0"/>
               </a:rPr>
-              <a:t> is in the process of being created!</a:t>
-            </a:r>
+              <a:t> contains the required class files </a:t>
+            </a:r>
+            <a:r>
+              <a:rPr lang="en-IN">
+                <a:latin typeface="Arial" panose="020B0604020202020204" pitchFamily="34" charset="0"/>
+                <a:cs typeface="Arial" panose="020B0604020202020204" pitchFamily="34" charset="0"/>
+              </a:rPr>
+              <a:t>and dependencies.</a:t>
+            </a:r>
+            <a:endParaRPr lang="en-IN" dirty="0">
+              <a:latin typeface="Arial" panose="020B0604020202020204" pitchFamily="34" charset="0"/>
+              <a:cs typeface="Arial" panose="020B0604020202020204" pitchFamily="34" charset="0"/>
+            </a:endParaRPr>
           </a:p>
         </p:txBody>
       </p:sp>

</xml_diff>